<commit_message>
new Qo plot added
</commit_message>
<xml_diff>
--- a/hexabenzocoronene/sto3g/correlation/correlation_hexabenzocoronene.pptx
+++ b/hexabenzocoronene/sto3g/correlation/correlation_hexabenzocoronene.pptx
@@ -486,7 +486,12 @@
             <p:ph type="sldImg"/>
           </p:nvPr>
         </p:nvSpPr>
-        <p:spPr/>
+        <p:spPr>
+          <a:xfrm>
+            <a:off x="-685800" y="1143000"/>
+            <a:ext cx="8229600" cy="3086100"/>
+          </a:xfrm>
+        </p:spPr>
       </p:sp>
       <p:sp>
         <p:nvSpPr>
@@ -572,7 +577,7 @@
         </p:nvSpPr>
         <p:spPr>
           <a:xfrm>
-            <a:off x="1524000" y="748242"/>
+            <a:off x="1524000" y="748243"/>
             <a:ext cx="9144000" cy="1591733"/>
           </a:xfrm>
         </p:spPr>
@@ -934,7 +939,7 @@
         </p:nvSpPr>
         <p:spPr>
           <a:xfrm>
-            <a:off x="8724900" y="243416"/>
+            <a:off x="8724900" y="243417"/>
             <a:ext cx="2628900" cy="3874559"/>
           </a:xfrm>
         </p:spPr>
@@ -962,7 +967,7 @@
         </p:nvSpPr>
         <p:spPr>
           <a:xfrm>
-            <a:off x="838200" y="243416"/>
+            <a:off x="838200" y="243417"/>
             <a:ext cx="7734300" cy="3874559"/>
           </a:xfrm>
         </p:spPr>
@@ -1316,7 +1321,7 @@
         </p:nvSpPr>
         <p:spPr>
           <a:xfrm>
-            <a:off x="831850" y="3059642"/>
+            <a:off x="831850" y="3059643"/>
             <a:ext cx="10515600" cy="1000125"/>
           </a:xfrm>
         </p:spPr>
@@ -1790,7 +1795,7 @@
         </p:nvSpPr>
         <p:spPr>
           <a:xfrm>
-            <a:off x="839789" y="1120775"/>
+            <a:off x="839791" y="1120776"/>
             <a:ext cx="5157787" cy="549275"/>
           </a:xfrm>
         </p:spPr>
@@ -1855,7 +1860,7 @@
         </p:nvSpPr>
         <p:spPr>
           <a:xfrm>
-            <a:off x="839789" y="1670050"/>
+            <a:off x="839791" y="1670050"/>
             <a:ext cx="5157787" cy="2456392"/>
           </a:xfrm>
         </p:spPr>
@@ -1912,7 +1917,7 @@
         </p:nvSpPr>
         <p:spPr>
           <a:xfrm>
-            <a:off x="6172200" y="1120775"/>
+            <a:off x="6172200" y="1120776"/>
             <a:ext cx="5183188" cy="549275"/>
           </a:xfrm>
         </p:spPr>
@@ -2374,7 +2379,7 @@
         </p:nvSpPr>
         <p:spPr>
           <a:xfrm>
-            <a:off x="5183188" y="658284"/>
+            <a:off x="5183188" y="658285"/>
             <a:ext cx="6172200" cy="3249083"/>
           </a:xfrm>
         </p:spPr>
@@ -2651,7 +2656,7 @@
         </p:nvSpPr>
         <p:spPr>
           <a:xfrm>
-            <a:off x="5183188" y="658284"/>
+            <a:off x="5183188" y="658285"/>
             <a:ext cx="6172200" cy="3249083"/>
           </a:xfrm>
         </p:spPr>
@@ -2851,9 +2856,12 @@
 <p:sldMaster xmlns:a="http://schemas.openxmlformats.org/drawingml/2006/main" xmlns:r="http://schemas.openxmlformats.org/officeDocument/2006/relationships" xmlns:p="http://schemas.openxmlformats.org/presentationml/2006/main">
   <p:cSld>
     <p:bg>
-      <p:bgRef idx="1001">
-        <a:schemeClr val="bg1"/>
-      </p:bgRef>
+      <p:bgPr>
+        <a:solidFill>
+          <a:schemeClr val="bg1"/>
+        </a:solidFill>
+        <a:effectLst/>
+      </p:bgPr>
     </p:bg>
     <p:spTree>
       <p:nvGrpSpPr>
@@ -2976,7 +2984,7 @@
         </p:nvSpPr>
         <p:spPr>
           <a:xfrm>
-            <a:off x="838200" y="4237567"/>
+            <a:off x="838200" y="4237568"/>
             <a:ext cx="2743200" cy="243417"/>
           </a:xfrm>
           <a:prstGeom prst="rect">
@@ -3017,7 +3025,7 @@
         </p:nvSpPr>
         <p:spPr>
           <a:xfrm>
-            <a:off x="4038600" y="4237567"/>
+            <a:off x="4038600" y="4237568"/>
             <a:ext cx="4114800" cy="243417"/>
           </a:xfrm>
           <a:prstGeom prst="rect">
@@ -3054,7 +3062,7 @@
         </p:nvSpPr>
         <p:spPr>
           <a:xfrm>
-            <a:off x="8610600" y="4237567"/>
+            <a:off x="8610600" y="4237568"/>
             <a:ext cx="2743200" cy="243417"/>
           </a:xfrm>
           <a:prstGeom prst="rect">
@@ -3390,14 +3398,6 @@
 <file path=ppt/slides/slide1.xml><?xml version="1.0" encoding="utf-8"?>
 <p:sld xmlns:a="http://schemas.openxmlformats.org/drawingml/2006/main" xmlns:r="http://schemas.openxmlformats.org/officeDocument/2006/relationships" xmlns:p="http://schemas.openxmlformats.org/presentationml/2006/main">
   <p:cSld>
-    <p:bg>
-      <p:bgPr>
-        <a:solidFill>
-          <a:schemeClr val="bg1"/>
-        </a:solidFill>
-        <a:effectLst/>
-      </p:bgPr>
-    </p:bg>
     <p:spTree>
       <p:nvGrpSpPr>
         <p:cNvPr id="1" name=""/>
@@ -3426,10 +3426,10 @@
         </p:nvGrpSpPr>
         <p:grpSpPr>
           <a:xfrm>
-            <a:off x="54848" y="0"/>
-            <a:ext cx="4572000" cy="4599522"/>
+            <a:off x="254200" y="10792"/>
+            <a:ext cx="4453504" cy="4599520"/>
             <a:chOff x="54848" y="0"/>
-            <a:chExt cx="4572000" cy="4599522"/>
+            <a:chExt cx="4357867" cy="4766691"/>
           </a:xfrm>
         </p:grpSpPr>
         <p:pic>
@@ -3455,7 +3455,7 @@
           <p:spPr>
             <a:xfrm>
               <a:off x="54848" y="0"/>
-              <a:ext cx="4572000" cy="4572000"/>
+              <a:ext cx="4357867" cy="4572000"/>
             </a:xfrm>
             <a:prstGeom prst="rect">
               <a:avLst/>
@@ -3476,10 +3476,10 @@
           </p:nvGrpSpPr>
           <p:grpSpPr>
             <a:xfrm>
-              <a:off x="314880" y="692059"/>
-              <a:ext cx="3068429" cy="3907463"/>
-              <a:chOff x="285060" y="2338946"/>
-              <a:chExt cx="3068429" cy="3907463"/>
+              <a:off x="147919" y="686128"/>
+              <a:ext cx="3286688" cy="4080563"/>
+              <a:chOff x="118099" y="2333015"/>
+              <a:chExt cx="3286688" cy="4080563"/>
             </a:xfrm>
           </p:grpSpPr>
           <p:sp>
@@ -3496,8 +3496,8 @@
             </p:nvSpPr>
             <p:spPr>
               <a:xfrm>
-                <a:off x="285060" y="2338946"/>
-                <a:ext cx="270997" cy="369332"/>
+                <a:off x="255181" y="2333015"/>
+                <a:ext cx="270997" cy="533201"/>
               </a:xfrm>
               <a:prstGeom prst="rect">
                 <a:avLst/>
@@ -3535,8 +3535,8 @@
             </p:nvSpPr>
             <p:spPr>
               <a:xfrm>
-                <a:off x="727618" y="2847735"/>
-                <a:ext cx="270997" cy="369332"/>
+                <a:off x="691585" y="2817995"/>
+                <a:ext cx="270997" cy="533201"/>
               </a:xfrm>
               <a:prstGeom prst="rect">
                 <a:avLst/>
@@ -3574,8 +3574,8 @@
             </p:nvSpPr>
             <p:spPr>
               <a:xfrm>
-                <a:off x="1213696" y="3304935"/>
-                <a:ext cx="270997" cy="369332"/>
+                <a:off x="1127990" y="3321504"/>
+                <a:ext cx="270997" cy="533201"/>
               </a:xfrm>
               <a:prstGeom prst="rect">
                 <a:avLst/>
@@ -3613,8 +3613,8 @@
             </p:nvSpPr>
             <p:spPr>
               <a:xfrm>
-                <a:off x="1656660" y="3751528"/>
-                <a:ext cx="270997" cy="369332"/>
+                <a:off x="1577803" y="3754636"/>
+                <a:ext cx="270997" cy="533201"/>
               </a:xfrm>
               <a:prstGeom prst="rect">
                 <a:avLst/>
@@ -3652,8 +3652,8 @@
             </p:nvSpPr>
             <p:spPr>
               <a:xfrm>
-                <a:off x="2099681" y="4222337"/>
-                <a:ext cx="270997" cy="369332"/>
+                <a:off x="2010507" y="4212615"/>
+                <a:ext cx="270997" cy="533201"/>
               </a:xfrm>
               <a:prstGeom prst="rect">
                 <a:avLst/>
@@ -3691,8 +3691,8 @@
             </p:nvSpPr>
             <p:spPr>
               <a:xfrm>
-                <a:off x="2562095" y="4635603"/>
-                <a:ext cx="270997" cy="369332"/>
+                <a:off x="2448659" y="4657487"/>
+                <a:ext cx="270997" cy="533201"/>
               </a:xfrm>
               <a:prstGeom prst="rect">
                 <a:avLst/>
@@ -3730,8 +3730,8 @@
             </p:nvSpPr>
             <p:spPr>
               <a:xfrm>
-                <a:off x="3021468" y="5164111"/>
-                <a:ext cx="270997" cy="369332"/>
+                <a:off x="2871729" y="5153346"/>
+                <a:ext cx="270997" cy="533201"/>
               </a:xfrm>
               <a:prstGeom prst="rect">
                 <a:avLst/>
@@ -3771,8 +3771,8 @@
                 </p:nvSpPr>
                 <p:spPr>
                   <a:xfrm>
-                    <a:off x="556057" y="5869639"/>
-                    <a:ext cx="2797432" cy="376770"/>
+                    <a:off x="118099" y="6023114"/>
+                    <a:ext cx="3286688" cy="390464"/>
                   </a:xfrm>
                   <a:prstGeom prst="rect">
                     <a:avLst/>
@@ -3780,14 +3780,27 @@
                   <a:noFill/>
                 </p:spPr>
                 <p:txBody>
-                  <a:bodyPr wrap="none" rtlCol="0">
+                  <a:bodyPr wrap="square" rtlCol="0">
                     <a:spAutoFit/>
                   </a:bodyPr>
                   <a:lstStyle/>
                   <a:p>
-                    <a:pPr marL="342900" indent="-342900">
-                      <a:buAutoNum type="alphaLcParenBoth"/>
-                    </a:pPr>
+                    <a:r>
+                      <a:rPr lang="en-US" dirty="0"/>
+                      <a:t> </a:t>
+                    </a:r>
+                    <a:r>
+                      <a:rPr lang="en-US" dirty="0">
+                        <a:latin typeface="Helvetica Neue" panose="02000503000000020004" pitchFamily="2" charset="0"/>
+                        <a:ea typeface="Helvetica Neue" panose="02000503000000020004" pitchFamily="2" charset="0"/>
+                        <a:cs typeface="Helvetica Neue" panose="02000503000000020004" pitchFamily="2" charset="0"/>
+                      </a:rPr>
+                      <a:t>(a)</a:t>
+                    </a:r>
+                    <a:r>
+                      <a:rPr lang="en-US" dirty="0"/>
+                      <a:t> </a:t>
+                    </a:r>
                     <a14:m>
                       <m:oMath xmlns:m="http://schemas.openxmlformats.org/officeDocument/2006/math">
                         <m:acc>
@@ -3801,13 +3814,19 @@
                           </m:accPr>
                           <m:e>
                             <m:r>
-                              <a:rPr lang="en-US" i="1">
+                              <a:rPr lang="en-US" b="0" i="1" smtClean="0">
                                 <a:latin typeface="Cambria Math" panose="02040503050406030204" pitchFamily="18" charset="0"/>
                               </a:rPr>
                               <m:t>𝑁</m:t>
                             </m:r>
                           </m:e>
                         </m:acc>
+                        <m:r>
+                          <a:rPr lang="en-US" b="0" i="1" smtClean="0">
+                            <a:latin typeface="Cambria Math" panose="02040503050406030204" pitchFamily="18" charset="0"/>
+                          </a:rPr>
+                          <m:t> </m:t>
+                        </m:r>
                       </m:oMath>
                     </a14:m>
                     <a:r>
@@ -3816,6 +3835,9 @@
                       </a:rPr>
                       <a:t> operator correlation</a:t>
                     </a:r>
+                    <a:endParaRPr lang="en-US" b="0" dirty="0">
+                      <a:latin typeface="Helvetica Neue" panose="02000503000000020004" pitchFamily="2" charset="0"/>
+                    </a:endParaRPr>
                   </a:p>
                 </p:txBody>
               </p:sp>
@@ -3837,8 +3859,8 @@
                 </p:nvSpPr>
                 <p:spPr>
                   <a:xfrm>
-                    <a:off x="556057" y="5869639"/>
-                    <a:ext cx="2797432" cy="376770"/>
+                    <a:off x="118099" y="6023114"/>
+                    <a:ext cx="3286688" cy="390464"/>
                   </a:xfrm>
                   <a:prstGeom prst="rect">
                     <a:avLst/>
@@ -3846,7 +3868,7 @@
                   <a:blipFill>
                     <a:blip r:embed="rId4"/>
                     <a:stretch>
-                      <a:fillRect l="-905" t="-6452" r="-905" b="-22581"/>
+                      <a:fillRect t="-6667" b="-26667"/>
                     </a:stretch>
                   </a:blipFill>
                 </p:spPr>
@@ -3881,10 +3903,10 @@
         </p:nvGrpSpPr>
         <p:grpSpPr>
           <a:xfrm>
-            <a:off x="7926638" y="0"/>
-            <a:ext cx="4169769" cy="4598203"/>
-            <a:chOff x="7996099" y="507195"/>
-            <a:chExt cx="4169769" cy="4598203"/>
+            <a:off x="7742192" y="10792"/>
+            <a:ext cx="4100494" cy="4580456"/>
+            <a:chOff x="7963084" y="518616"/>
+            <a:chExt cx="4205148" cy="4847597"/>
           </a:xfrm>
         </p:grpSpPr>
         <p:pic>
@@ -3897,7 +3919,7 @@
               </a:extLst>
             </p:cNvPr>
             <p:cNvPicPr>
-              <a:picLocks noChangeAspect="1"/>
+              <a:picLocks/>
             </p:cNvPicPr>
             <p:nvPr/>
           </p:nvPicPr>
@@ -3908,8 +3930,8 @@
           </p:blipFill>
           <p:spPr>
             <a:xfrm>
-              <a:off x="7996099" y="507195"/>
-              <a:ext cx="4169769" cy="4572000"/>
+              <a:off x="7963084" y="518616"/>
+              <a:ext cx="4205148" cy="4572002"/>
             </a:xfrm>
             <a:prstGeom prst="rect">
               <a:avLst/>
@@ -3930,10 +3952,10 @@
           </p:nvGrpSpPr>
           <p:grpSpPr>
             <a:xfrm>
-              <a:off x="8200706" y="1211823"/>
-              <a:ext cx="3300357" cy="3893575"/>
-              <a:chOff x="8200706" y="2354822"/>
-              <a:chExt cx="3300357" cy="3893575"/>
+              <a:off x="8161531" y="1219294"/>
+              <a:ext cx="3175494" cy="4146919"/>
+              <a:chOff x="8161531" y="2362293"/>
+              <a:chExt cx="3175494" cy="4146919"/>
             </a:xfrm>
           </p:grpSpPr>
           <p:sp>
@@ -3950,8 +3972,8 @@
             </p:nvSpPr>
             <p:spPr>
               <a:xfrm>
-                <a:off x="8200706" y="2354822"/>
-                <a:ext cx="455300" cy="369332"/>
+                <a:off x="8161531" y="2362293"/>
+                <a:ext cx="455300" cy="390872"/>
               </a:xfrm>
               <a:prstGeom prst="rect">
                 <a:avLst/>
@@ -3989,8 +4011,8 @@
             </p:nvSpPr>
             <p:spPr>
               <a:xfrm>
-                <a:off x="8687279" y="2847735"/>
-                <a:ext cx="270997" cy="369332"/>
+                <a:off x="8663991" y="2814393"/>
+                <a:ext cx="270997" cy="630833"/>
               </a:xfrm>
               <a:prstGeom prst="rect">
                 <a:avLst/>
@@ -4028,8 +4050,8 @@
             </p:nvSpPr>
             <p:spPr>
               <a:xfrm>
-                <a:off x="9167358" y="3304935"/>
-                <a:ext cx="270997" cy="369332"/>
+                <a:off x="9119688" y="3285419"/>
+                <a:ext cx="270997" cy="630833"/>
               </a:xfrm>
               <a:prstGeom prst="rect">
                 <a:avLst/>
@@ -4067,8 +4089,8 @@
             </p:nvSpPr>
             <p:spPr>
               <a:xfrm>
-                <a:off x="9624890" y="3751528"/>
-                <a:ext cx="270997" cy="369332"/>
+                <a:off x="9575385" y="3770897"/>
+                <a:ext cx="270997" cy="630833"/>
               </a:xfrm>
               <a:prstGeom prst="rect">
                 <a:avLst/>
@@ -4106,8 +4128,8 @@
             </p:nvSpPr>
             <p:spPr>
               <a:xfrm>
-                <a:off x="10078922" y="4222337"/>
-                <a:ext cx="270997" cy="369332"/>
+                <a:off x="10076774" y="4222669"/>
+                <a:ext cx="270997" cy="630833"/>
               </a:xfrm>
               <a:prstGeom prst="rect">
                 <a:avLst/>
@@ -4145,8 +4167,8 @@
             </p:nvSpPr>
             <p:spPr>
               <a:xfrm>
-                <a:off x="10571815" y="4635603"/>
-                <a:ext cx="270997" cy="369332"/>
+                <a:off x="10532916" y="4681328"/>
+                <a:ext cx="270997" cy="630833"/>
               </a:xfrm>
               <a:prstGeom prst="rect">
                 <a:avLst/>
@@ -4184,8 +4206,8 @@
             </p:nvSpPr>
             <p:spPr>
               <a:xfrm>
-                <a:off x="11008593" y="5167418"/>
-                <a:ext cx="270997" cy="369332"/>
+                <a:off x="10989058" y="5156106"/>
+                <a:ext cx="270997" cy="630833"/>
               </a:xfrm>
               <a:prstGeom prst="rect">
                 <a:avLst/>
@@ -4225,8 +4247,8 @@
                 </p:nvSpPr>
                 <p:spPr>
                   <a:xfrm>
-                    <a:off x="8687279" y="5869639"/>
-                    <a:ext cx="2813784" cy="378758"/>
+                    <a:off x="8389182" y="6108364"/>
+                    <a:ext cx="2947843" cy="400848"/>
                   </a:xfrm>
                   <a:prstGeom prst="rect">
                     <a:avLst/>
@@ -4321,8 +4343,8 @@
                 </p:nvSpPr>
                 <p:spPr>
                   <a:xfrm>
-                    <a:off x="8687279" y="5869639"/>
-                    <a:ext cx="2813784" cy="378758"/>
+                    <a:off x="8389182" y="6108364"/>
+                    <a:ext cx="2947843" cy="400848"/>
                   </a:xfrm>
                   <a:prstGeom prst="rect">
                     <a:avLst/>
@@ -4330,7 +4352,7 @@
                   <a:blipFill>
                     <a:blip r:embed="rId6"/>
                     <a:stretch>
-                      <a:fillRect l="-1794" t="-6667" r="-448" b="-26667"/>
+                      <a:fillRect l="-1762" t="-6452" b="-22581"/>
                     </a:stretch>
                   </a:blipFill>
                 </p:spPr>
@@ -4366,9 +4388,9 @@
         <p:grpSpPr>
           <a:xfrm>
             <a:off x="4355386" y="1073960"/>
-            <a:ext cx="3419455" cy="3525732"/>
+            <a:ext cx="3419455" cy="3536352"/>
             <a:chOff x="4386277" y="1565283"/>
-            <a:chExt cx="3419455" cy="3525732"/>
+            <a:chExt cx="3419455" cy="3536352"/>
           </a:xfrm>
         </p:grpSpPr>
         <p:pic>
@@ -4415,10 +4437,10 @@
           </p:nvGrpSpPr>
           <p:grpSpPr>
             <a:xfrm>
-              <a:off x="4661835" y="1889402"/>
-              <a:ext cx="2634696" cy="3201613"/>
-              <a:chOff x="4661835" y="3032401"/>
-              <a:chExt cx="2634696" cy="3201613"/>
+              <a:off x="4762610" y="1889402"/>
+              <a:ext cx="2634696" cy="3212233"/>
+              <a:chOff x="4762610" y="3032401"/>
+              <a:chExt cx="2634696" cy="3212233"/>
             </a:xfrm>
           </p:grpSpPr>
           <p:sp>
@@ -5086,7 +5108,7 @@
             </p:nvSpPr>
             <p:spPr>
               <a:xfrm>
-                <a:off x="4661835" y="5864682"/>
+                <a:off x="4762610" y="5875302"/>
                 <a:ext cx="2634696" cy="369332"/>
               </a:xfrm>
               <a:prstGeom prst="rect">

</xml_diff>